<commit_message>
fix example - for each
</commit_message>
<xml_diff>
--- a/Modul_03_Ressources/Ressources.pptx
+++ b/Modul_03_Ressources/Ressources.pptx
@@ -1194,334 +1194,6 @@
       <dsp:cNvGrpSpPr/>
     </dsp:nvGrpSpPr>
     <dsp:grpSpPr/>
-    <dsp:sp modelId="{EB5E673E-33F1-46A3-B2CF-D8E5A83AB1E5}">
-      <dsp:nvSpPr>
-        <dsp:cNvPr id="0" name=""/>
-        <dsp:cNvSpPr/>
-      </dsp:nvSpPr>
-      <dsp:spPr>
-        <a:xfrm>
-          <a:off x="5140" y="548891"/>
-          <a:ext cx="2992590" cy="1197036"/>
-        </a:xfrm>
-        <a:prstGeom prst="chevron">
-          <a:avLst/>
-        </a:prstGeom>
-        <a:solidFill>
-          <a:schemeClr val="accent1">
-            <a:hueOff val="0"/>
-            <a:satOff val="0"/>
-            <a:lumOff val="0"/>
-            <a:alphaOff val="0"/>
-          </a:schemeClr>
-        </a:solidFill>
-        <a:ln w="12700" cap="flat" cmpd="sng" algn="ctr">
-          <a:solidFill>
-            <a:schemeClr val="lt1">
-              <a:hueOff val="0"/>
-              <a:satOff val="0"/>
-              <a:lumOff val="0"/>
-              <a:alphaOff val="0"/>
-            </a:schemeClr>
-          </a:solidFill>
-          <a:prstDash val="solid"/>
-          <a:miter lim="800000"/>
-        </a:ln>
-        <a:effectLst/>
-      </dsp:spPr>
-      <dsp:style>
-        <a:lnRef idx="2">
-          <a:scrgbClr r="0" g="0" b="0"/>
-        </a:lnRef>
-        <a:fillRef idx="1">
-          <a:scrgbClr r="0" g="0" b="0"/>
-        </a:fillRef>
-        <a:effectRef idx="0">
-          <a:scrgbClr r="0" g="0" b="0"/>
-        </a:effectRef>
-        <a:fontRef idx="minor">
-          <a:schemeClr val="lt1"/>
-        </a:fontRef>
-      </dsp:style>
-      <dsp:txBody>
-        <a:bodyPr spcFirstLastPara="0" vert="horz" wrap="square" lIns="104013" tIns="34671" rIns="34671" bIns="34671" numCol="1" spcCol="1270" anchor="ctr" anchorCtr="0">
-          <a:noAutofit/>
-        </a:bodyPr>
-        <a:lstStyle/>
-        <a:p>
-          <a:pPr lvl="0" algn="ctr" defTabSz="1155700">
-            <a:lnSpc>
-              <a:spcPct val="90000"/>
-            </a:lnSpc>
-            <a:spcBef>
-              <a:spcPct val="0"/>
-            </a:spcBef>
-            <a:spcAft>
-              <a:spcPct val="35000"/>
-            </a:spcAft>
-          </a:pPr>
-          <a:r>
-            <a:rPr lang="de-DE" sz="2600" kern="1200" dirty="0" smtClean="0"/>
-            <a:t>Create</a:t>
-          </a:r>
-          <a:endParaRPr lang="de-DE" sz="2600" kern="1200" dirty="0"/>
-        </a:p>
-      </dsp:txBody>
-      <dsp:txXfrm>
-        <a:off x="603658" y="548891"/>
-        <a:ext cx="1795554" cy="1197036"/>
-      </dsp:txXfrm>
-    </dsp:sp>
-    <dsp:sp modelId="{D6A44A52-7EE1-4EFA-8D93-F4FC516819A9}">
-      <dsp:nvSpPr>
-        <dsp:cNvPr id="0" name=""/>
-        <dsp:cNvSpPr/>
-      </dsp:nvSpPr>
-      <dsp:spPr>
-        <a:xfrm>
-          <a:off x="2698472" y="548891"/>
-          <a:ext cx="2992590" cy="1197036"/>
-        </a:xfrm>
-        <a:prstGeom prst="chevron">
-          <a:avLst/>
-        </a:prstGeom>
-        <a:solidFill>
-          <a:schemeClr val="accent1">
-            <a:hueOff val="0"/>
-            <a:satOff val="0"/>
-            <a:lumOff val="0"/>
-            <a:alphaOff val="0"/>
-          </a:schemeClr>
-        </a:solidFill>
-        <a:ln w="12700" cap="flat" cmpd="sng" algn="ctr">
-          <a:solidFill>
-            <a:schemeClr val="lt1">
-              <a:hueOff val="0"/>
-              <a:satOff val="0"/>
-              <a:lumOff val="0"/>
-              <a:alphaOff val="0"/>
-            </a:schemeClr>
-          </a:solidFill>
-          <a:prstDash val="solid"/>
-          <a:miter lim="800000"/>
-        </a:ln>
-        <a:effectLst/>
-      </dsp:spPr>
-      <dsp:style>
-        <a:lnRef idx="2">
-          <a:scrgbClr r="0" g="0" b="0"/>
-        </a:lnRef>
-        <a:fillRef idx="1">
-          <a:scrgbClr r="0" g="0" b="0"/>
-        </a:fillRef>
-        <a:effectRef idx="0">
-          <a:scrgbClr r="0" g="0" b="0"/>
-        </a:effectRef>
-        <a:fontRef idx="minor">
-          <a:schemeClr val="lt1"/>
-        </a:fontRef>
-      </dsp:style>
-      <dsp:txBody>
-        <a:bodyPr spcFirstLastPara="0" vert="horz" wrap="square" lIns="104013" tIns="34671" rIns="34671" bIns="34671" numCol="1" spcCol="1270" anchor="ctr" anchorCtr="0">
-          <a:noAutofit/>
-        </a:bodyPr>
-        <a:lstStyle/>
-        <a:p>
-          <a:pPr lvl="0" algn="ctr" defTabSz="1155700">
-            <a:lnSpc>
-              <a:spcPct val="90000"/>
-            </a:lnSpc>
-            <a:spcBef>
-              <a:spcPct val="0"/>
-            </a:spcBef>
-            <a:spcAft>
-              <a:spcPct val="35000"/>
-            </a:spcAft>
-          </a:pPr>
-          <a:r>
-            <a:rPr lang="de-DE" sz="2600" kern="1200" dirty="0" err="1" smtClean="0"/>
-            <a:t>Destroy</a:t>
-          </a:r>
-          <a:endParaRPr lang="de-DE" sz="2600" kern="1200" dirty="0"/>
-        </a:p>
-      </dsp:txBody>
-      <dsp:txXfrm>
-        <a:off x="3296990" y="548891"/>
-        <a:ext cx="1795554" cy="1197036"/>
-      </dsp:txXfrm>
-    </dsp:sp>
-    <dsp:sp modelId="{A95A2FA1-2525-4E62-912B-28C162AD2F23}">
-      <dsp:nvSpPr>
-        <dsp:cNvPr id="0" name=""/>
-        <dsp:cNvSpPr/>
-      </dsp:nvSpPr>
-      <dsp:spPr>
-        <a:xfrm>
-          <a:off x="5391803" y="548891"/>
-          <a:ext cx="2992590" cy="1197036"/>
-        </a:xfrm>
-        <a:prstGeom prst="chevron">
-          <a:avLst/>
-        </a:prstGeom>
-        <a:solidFill>
-          <a:schemeClr val="accent1">
-            <a:hueOff val="0"/>
-            <a:satOff val="0"/>
-            <a:lumOff val="0"/>
-            <a:alphaOff val="0"/>
-          </a:schemeClr>
-        </a:solidFill>
-        <a:ln w="12700" cap="flat" cmpd="sng" algn="ctr">
-          <a:solidFill>
-            <a:schemeClr val="lt1">
-              <a:hueOff val="0"/>
-              <a:satOff val="0"/>
-              <a:lumOff val="0"/>
-              <a:alphaOff val="0"/>
-            </a:schemeClr>
-          </a:solidFill>
-          <a:prstDash val="solid"/>
-          <a:miter lim="800000"/>
-        </a:ln>
-        <a:effectLst/>
-      </dsp:spPr>
-      <dsp:style>
-        <a:lnRef idx="2">
-          <a:scrgbClr r="0" g="0" b="0"/>
-        </a:lnRef>
-        <a:fillRef idx="1">
-          <a:scrgbClr r="0" g="0" b="0"/>
-        </a:fillRef>
-        <a:effectRef idx="0">
-          <a:scrgbClr r="0" g="0" b="0"/>
-        </a:effectRef>
-        <a:fontRef idx="minor">
-          <a:schemeClr val="lt1"/>
-        </a:fontRef>
-      </dsp:style>
-      <dsp:txBody>
-        <a:bodyPr spcFirstLastPara="0" vert="horz" wrap="square" lIns="104013" tIns="34671" rIns="34671" bIns="34671" numCol="1" spcCol="1270" anchor="ctr" anchorCtr="0">
-          <a:noAutofit/>
-        </a:bodyPr>
-        <a:lstStyle/>
-        <a:p>
-          <a:pPr lvl="0" algn="ctr" defTabSz="1155700">
-            <a:lnSpc>
-              <a:spcPct val="90000"/>
-            </a:lnSpc>
-            <a:spcBef>
-              <a:spcPct val="0"/>
-            </a:spcBef>
-            <a:spcAft>
-              <a:spcPct val="35000"/>
-            </a:spcAft>
-          </a:pPr>
-          <a:r>
-            <a:rPr lang="de-DE" sz="2600" kern="1200" dirty="0" smtClean="0"/>
-            <a:t>Update</a:t>
-          </a:r>
-          <a:endParaRPr lang="de-DE" sz="2600" kern="1200" dirty="0"/>
-        </a:p>
-      </dsp:txBody>
-      <dsp:txXfrm>
-        <a:off x="5990321" y="548891"/>
-        <a:ext cx="1795554" cy="1197036"/>
-      </dsp:txXfrm>
-    </dsp:sp>
-    <dsp:sp modelId="{1CCDB9B4-44E7-4A67-8847-3F3690177928}">
-      <dsp:nvSpPr>
-        <dsp:cNvPr id="0" name=""/>
-        <dsp:cNvSpPr/>
-      </dsp:nvSpPr>
-      <dsp:spPr>
-        <a:xfrm>
-          <a:off x="8085135" y="548891"/>
-          <a:ext cx="2992590" cy="1197036"/>
-        </a:xfrm>
-        <a:prstGeom prst="chevron">
-          <a:avLst/>
-        </a:prstGeom>
-        <a:solidFill>
-          <a:schemeClr val="accent1">
-            <a:hueOff val="0"/>
-            <a:satOff val="0"/>
-            <a:lumOff val="0"/>
-            <a:alphaOff val="0"/>
-          </a:schemeClr>
-        </a:solidFill>
-        <a:ln w="12700" cap="flat" cmpd="sng" algn="ctr">
-          <a:solidFill>
-            <a:schemeClr val="lt1">
-              <a:hueOff val="0"/>
-              <a:satOff val="0"/>
-              <a:lumOff val="0"/>
-              <a:alphaOff val="0"/>
-            </a:schemeClr>
-          </a:solidFill>
-          <a:prstDash val="solid"/>
-          <a:miter lim="800000"/>
-        </a:ln>
-        <a:effectLst/>
-      </dsp:spPr>
-      <dsp:style>
-        <a:lnRef idx="2">
-          <a:scrgbClr r="0" g="0" b="0"/>
-        </a:lnRef>
-        <a:fillRef idx="1">
-          <a:scrgbClr r="0" g="0" b="0"/>
-        </a:fillRef>
-        <a:effectRef idx="0">
-          <a:scrgbClr r="0" g="0" b="0"/>
-        </a:effectRef>
-        <a:fontRef idx="minor">
-          <a:schemeClr val="lt1"/>
-        </a:fontRef>
-      </dsp:style>
-      <dsp:txBody>
-        <a:bodyPr spcFirstLastPara="0" vert="horz" wrap="square" lIns="104013" tIns="34671" rIns="34671" bIns="34671" numCol="1" spcCol="1270" anchor="ctr" anchorCtr="0">
-          <a:noAutofit/>
-        </a:bodyPr>
-        <a:lstStyle/>
-        <a:p>
-          <a:pPr lvl="0" algn="ctr" defTabSz="1155700">
-            <a:lnSpc>
-              <a:spcPct val="90000"/>
-            </a:lnSpc>
-            <a:spcBef>
-              <a:spcPct val="0"/>
-            </a:spcBef>
-            <a:spcAft>
-              <a:spcPct val="35000"/>
-            </a:spcAft>
-          </a:pPr>
-          <a:r>
-            <a:rPr lang="de-DE" sz="2600" kern="1200" dirty="0" err="1" smtClean="0"/>
-            <a:t>Destroy</a:t>
-          </a:r>
-          <a:r>
-            <a:rPr lang="de-DE" sz="2600" kern="1200" dirty="0" smtClean="0"/>
-            <a:t> </a:t>
-          </a:r>
-          <a:r>
-            <a:rPr lang="de-DE" sz="2600" kern="1200" dirty="0" err="1" smtClean="0"/>
-            <a:t>and</a:t>
-          </a:r>
-          <a:r>
-            <a:rPr lang="de-DE" sz="2600" kern="1200" dirty="0" smtClean="0"/>
-            <a:t> </a:t>
-          </a:r>
-          <a:r>
-            <a:rPr lang="de-DE" sz="2600" kern="1200" dirty="0" err="1" smtClean="0"/>
-            <a:t>re-create</a:t>
-          </a:r>
-          <a:endParaRPr lang="de-DE" sz="2600" kern="1200" dirty="0"/>
-        </a:p>
-      </dsp:txBody>
-      <dsp:txXfrm>
-        <a:off x="8683653" y="548891"/>
-        <a:ext cx="1795554" cy="1197036"/>
-      </dsp:txXfrm>
-    </dsp:sp>
   </dsp:spTree>
 </dsp:drawing>
 </file>
@@ -2925,7 +2597,7 @@
           <a:p>
             <a:fld id="{E9DAB8B5-B9A3-426D-91D9-D7966B0F2B79}" type="datetimeFigureOut">
               <a:rPr lang="de-DE" smtClean="0"/>
-              <a:t>14.11.2021</a:t>
+              <a:t>22.11.2021</a:t>
             </a:fld>
             <a:endParaRPr lang="de-DE"/>
           </a:p>
@@ -4963,7 +4635,7 @@
           <a:p>
             <a:fld id="{6CBA03CC-73C5-46A8-8DFB-B5DC4577D8E2}" type="datetimeFigureOut">
               <a:rPr lang="de-DE" smtClean="0"/>
-              <a:t>14.11.2021</a:t>
+              <a:t>22.11.2021</a:t>
             </a:fld>
             <a:endParaRPr lang="de-DE"/>
           </a:p>
@@ -5133,7 +4805,7 @@
           <a:p>
             <a:fld id="{6CBA03CC-73C5-46A8-8DFB-B5DC4577D8E2}" type="datetimeFigureOut">
               <a:rPr lang="de-DE" smtClean="0"/>
-              <a:t>14.11.2021</a:t>
+              <a:t>22.11.2021</a:t>
             </a:fld>
             <a:endParaRPr lang="de-DE"/>
           </a:p>
@@ -5313,7 +4985,7 @@
           <a:p>
             <a:fld id="{6CBA03CC-73C5-46A8-8DFB-B5DC4577D8E2}" type="datetimeFigureOut">
               <a:rPr lang="de-DE" smtClean="0"/>
-              <a:t>14.11.2021</a:t>
+              <a:t>22.11.2021</a:t>
             </a:fld>
             <a:endParaRPr lang="de-DE"/>
           </a:p>
@@ -5483,7 +5155,7 @@
           <a:p>
             <a:fld id="{6CBA03CC-73C5-46A8-8DFB-B5DC4577D8E2}" type="datetimeFigureOut">
               <a:rPr lang="de-DE" smtClean="0"/>
-              <a:t>14.11.2021</a:t>
+              <a:t>22.11.2021</a:t>
             </a:fld>
             <a:endParaRPr lang="de-DE"/>
           </a:p>
@@ -5729,7 +5401,7 @@
           <a:p>
             <a:fld id="{6CBA03CC-73C5-46A8-8DFB-B5DC4577D8E2}" type="datetimeFigureOut">
               <a:rPr lang="de-DE" smtClean="0"/>
-              <a:t>14.11.2021</a:t>
+              <a:t>22.11.2021</a:t>
             </a:fld>
             <a:endParaRPr lang="de-DE"/>
           </a:p>
@@ -5961,7 +5633,7 @@
           <a:p>
             <a:fld id="{6CBA03CC-73C5-46A8-8DFB-B5DC4577D8E2}" type="datetimeFigureOut">
               <a:rPr lang="de-DE" smtClean="0"/>
-              <a:t>14.11.2021</a:t>
+              <a:t>22.11.2021</a:t>
             </a:fld>
             <a:endParaRPr lang="de-DE"/>
           </a:p>
@@ -6328,7 +6000,7 @@
           <a:p>
             <a:fld id="{6CBA03CC-73C5-46A8-8DFB-B5DC4577D8E2}" type="datetimeFigureOut">
               <a:rPr lang="de-DE" smtClean="0"/>
-              <a:t>14.11.2021</a:t>
+              <a:t>22.11.2021</a:t>
             </a:fld>
             <a:endParaRPr lang="de-DE"/>
           </a:p>
@@ -6446,7 +6118,7 @@
           <a:p>
             <a:fld id="{6CBA03CC-73C5-46A8-8DFB-B5DC4577D8E2}" type="datetimeFigureOut">
               <a:rPr lang="de-DE" smtClean="0"/>
-              <a:t>14.11.2021</a:t>
+              <a:t>22.11.2021</a:t>
             </a:fld>
             <a:endParaRPr lang="de-DE"/>
           </a:p>
@@ -6541,7 +6213,7 @@
           <a:p>
             <a:fld id="{6CBA03CC-73C5-46A8-8DFB-B5DC4577D8E2}" type="datetimeFigureOut">
               <a:rPr lang="de-DE" smtClean="0"/>
-              <a:t>14.11.2021</a:t>
+              <a:t>22.11.2021</a:t>
             </a:fld>
             <a:endParaRPr lang="de-DE"/>
           </a:p>
@@ -6818,7 +6490,7 @@
           <a:p>
             <a:fld id="{6CBA03CC-73C5-46A8-8DFB-B5DC4577D8E2}" type="datetimeFigureOut">
               <a:rPr lang="de-DE" smtClean="0"/>
-              <a:t>14.11.2021</a:t>
+              <a:t>22.11.2021</a:t>
             </a:fld>
             <a:endParaRPr lang="de-DE"/>
           </a:p>
@@ -7071,7 +6743,7 @@
           <a:p>
             <a:fld id="{6CBA03CC-73C5-46A8-8DFB-B5DC4577D8E2}" type="datetimeFigureOut">
               <a:rPr lang="de-DE" smtClean="0"/>
-              <a:t>14.11.2021</a:t>
+              <a:t>22.11.2021</a:t>
             </a:fld>
             <a:endParaRPr lang="de-DE"/>
           </a:p>
@@ -7284,7 +6956,7 @@
           <a:p>
             <a:fld id="{6CBA03CC-73C5-46A8-8DFB-B5DC4577D8E2}" type="datetimeFigureOut">
               <a:rPr lang="de-DE" smtClean="0"/>
-              <a:t>14.11.2021</a:t>
+              <a:t>22.11.2021</a:t>
             </a:fld>
             <a:endParaRPr lang="de-DE"/>
           </a:p>
@@ -19030,7 +18702,7 @@
               <a:t>= </a:t>
             </a:r>
             <a:r>
-              <a:rPr kumimoji="0" lang="de-DE" altLang="de-DE" sz="2400" b="0" i="0" u="none" strike="noStrike" cap="none" normalizeH="0" baseline="0" dirty="0" err="1" smtClean="0">
+              <a:rPr kumimoji="0" lang="de-DE" altLang="de-DE" sz="2400" b="0" i="0" u="none" strike="noStrike" cap="none" normalizeH="0" baseline="0" smtClean="0">
                 <a:ln>
                   <a:noFill/>
                 </a:ln>
@@ -19043,7 +18715,7 @@
               <a:t>aws_iam_user</a:t>
             </a:r>
             <a:r>
-              <a:rPr kumimoji="0" lang="de-DE" altLang="de-DE" sz="2400" b="0" i="0" u="none" strike="noStrike" cap="none" normalizeH="0" baseline="0" dirty="0" err="1" smtClean="0">
+              <a:rPr kumimoji="0" lang="de-DE" altLang="de-DE" sz="2400" b="0" i="0" u="none" strike="noStrike" cap="none" normalizeH="0" baseline="0" smtClean="0">
                 <a:ln>
                   <a:noFill/>
                 </a:ln>
@@ -19056,17 +18728,26 @@
               <a:t>.</a:t>
             </a:r>
             <a:r>
-              <a:rPr kumimoji="0" lang="de-DE" altLang="de-DE" sz="2400" b="0" i="0" u="none" strike="noStrike" cap="none" normalizeH="0" baseline="0" dirty="0" err="1" smtClean="0">
-                <a:ln>
-                  <a:noFill/>
-                </a:ln>
+              <a:rPr lang="de-DE" altLang="de-DE" sz="2400" smtClean="0">
                 <a:solidFill>
                   <a:srgbClr val="E5C07B"/>
                 </a:solidFill>
-                <a:effectLst/>
-                <a:latin typeface="JetBrains Mono"/>
-              </a:rPr>
-              <a:t>my_user</a:t>
+                <a:latin typeface="JetBrains Mono"/>
+              </a:rPr>
+              <a:t>demo</a:t>
+            </a:r>
+            <a:r>
+              <a:rPr kumimoji="0" lang="de-DE" altLang="de-DE" sz="2400" b="0" i="0" u="none" strike="noStrike" cap="none" normalizeH="0" baseline="0" smtClean="0">
+                <a:ln>
+                  <a:noFill/>
+                </a:ln>
+                <a:solidFill>
+                  <a:srgbClr val="E5C07B"/>
+                </a:solidFill>
+                <a:effectLst/>
+                <a:latin typeface="JetBrains Mono"/>
+              </a:rPr>
+              <a:t>_user</a:t>
             </a:r>
             <a:r>
               <a:rPr lang="de-DE" altLang="de-DE" sz="2400" dirty="0" smtClean="0">

</xml_diff>

<commit_message>
small fixes in var names
</commit_message>
<xml_diff>
--- a/Modul_03_Ressources/Ressources.pptx
+++ b/Modul_03_Ressources/Ressources.pptx
@@ -18702,7 +18702,7 @@
               <a:t>= </a:t>
             </a:r>
             <a:r>
-              <a:rPr kumimoji="0" lang="de-DE" altLang="de-DE" sz="2400" b="0" i="0" u="none" strike="noStrike" cap="none" normalizeH="0" baseline="0" smtClean="0">
+              <a:rPr kumimoji="0" lang="de-DE" altLang="de-DE" sz="2400" b="0" i="0" u="none" strike="noStrike" cap="none" normalizeH="0" baseline="0" dirty="0" err="1" smtClean="0">
                 <a:ln>
                   <a:noFill/>
                 </a:ln>
@@ -18715,7 +18715,7 @@
               <a:t>aws_iam_user</a:t>
             </a:r>
             <a:r>
-              <a:rPr kumimoji="0" lang="de-DE" altLang="de-DE" sz="2400" b="0" i="0" u="none" strike="noStrike" cap="none" normalizeH="0" baseline="0" smtClean="0">
+              <a:rPr kumimoji="0" lang="de-DE" altLang="de-DE" sz="2400" b="0" i="0" u="none" strike="noStrike" cap="none" normalizeH="0" baseline="0" dirty="0" err="1" smtClean="0">
                 <a:ln>
                   <a:noFill/>
                 </a:ln>
@@ -18728,7 +18728,7 @@
               <a:t>.</a:t>
             </a:r>
             <a:r>
-              <a:rPr lang="de-DE" altLang="de-DE" sz="2400" smtClean="0">
+              <a:rPr lang="de-DE" altLang="de-DE" sz="2400" dirty="0" err="1" smtClean="0">
                 <a:solidFill>
                   <a:srgbClr val="E5C07B"/>
                 </a:solidFill>
@@ -18737,7 +18737,7 @@
               <a:t>demo</a:t>
             </a:r>
             <a:r>
-              <a:rPr kumimoji="0" lang="de-DE" altLang="de-DE" sz="2400" b="0" i="0" u="none" strike="noStrike" cap="none" normalizeH="0" baseline="0" smtClean="0">
+              <a:rPr kumimoji="0" lang="de-DE" altLang="de-DE" sz="2400" b="0" i="0" u="none" strike="noStrike" cap="none" normalizeH="0" baseline="0" dirty="0" err="1" smtClean="0">
                 <a:ln>
                   <a:noFill/>
                 </a:ln>

</xml_diff>